<commit_message>
some clean up edits
</commit_message>
<xml_diff>
--- a/PRIDE_guide.pptx
+++ b/PRIDE_guide.pptx
@@ -230,7 +230,7 @@
           <a:p>
             <a:fld id="{AAC32C26-C210-4748-A588-D178AEDC23D7}" type="datetimeFigureOut">
               <a:rPr lang="en-US" smtClean="0"/>
-              <a:t>5/18/20</a:t>
+              <a:t>7/7/20</a:t>
             </a:fld>
             <a:endParaRPr lang="en-US"/>
           </a:p>
@@ -551,15 +551,23 @@
             </a:r>
             <a:r>
               <a:rPr lang="en-US" dirty="0"/>
-              <a:t> data submissions. This </a:t>
-            </a:r>
-            <a:r>
-              <a:rPr lang="en-US" dirty="0" err="1"/>
-              <a:t>quide</a:t>
-            </a:r>
-            <a:r>
-              <a:rPr lang="en-US" dirty="0"/>
-              <a:t> is how I prepare the data and metadata for submissions.</a:t>
+              <a:t> data submissions. </a:t>
+            </a:r>
+            <a:r>
+              <a:rPr lang="en-US"/>
+              <a:t>This </a:t>
+            </a:r>
+            <a:r>
+              <a:rPr lang="en-US" dirty="0"/>
+              <a:t>g</a:t>
+            </a:r>
+            <a:r>
+              <a:rPr lang="en-US"/>
+              <a:t>uide </a:t>
+            </a:r>
+            <a:r>
+              <a:rPr lang="en-US" dirty="0"/>
+              <a:t>is how I prepare the data and metadata for submissions.</a:t>
             </a:r>
           </a:p>
         </p:txBody>
@@ -3441,7 +3449,7 @@
           <a:p>
             <a:fld id="{6EB66592-1FC9-4D0B-BF3C-944475169FEE}" type="datetimeFigureOut">
               <a:rPr lang="en-US" smtClean="0"/>
-              <a:t>5/18/20</a:t>
+              <a:t>7/7/20</a:t>
             </a:fld>
             <a:endParaRPr lang="en-US"/>
           </a:p>
@@ -3639,7 +3647,7 @@
           <a:p>
             <a:fld id="{6EB66592-1FC9-4D0B-BF3C-944475169FEE}" type="datetimeFigureOut">
               <a:rPr lang="en-US" smtClean="0"/>
-              <a:t>5/18/20</a:t>
+              <a:t>7/7/20</a:t>
             </a:fld>
             <a:endParaRPr lang="en-US"/>
           </a:p>
@@ -3847,7 +3855,7 @@
           <a:p>
             <a:fld id="{6EB66592-1FC9-4D0B-BF3C-944475169FEE}" type="datetimeFigureOut">
               <a:rPr lang="en-US" smtClean="0"/>
-              <a:t>5/18/20</a:t>
+              <a:t>7/7/20</a:t>
             </a:fld>
             <a:endParaRPr lang="en-US"/>
           </a:p>
@@ -4045,7 +4053,7 @@
           <a:p>
             <a:fld id="{6EB66592-1FC9-4D0B-BF3C-944475169FEE}" type="datetimeFigureOut">
               <a:rPr lang="en-US" smtClean="0"/>
-              <a:t>5/18/20</a:t>
+              <a:t>7/7/20</a:t>
             </a:fld>
             <a:endParaRPr lang="en-US"/>
           </a:p>
@@ -4320,7 +4328,7 @@
           <a:p>
             <a:fld id="{6EB66592-1FC9-4D0B-BF3C-944475169FEE}" type="datetimeFigureOut">
               <a:rPr lang="en-US" smtClean="0"/>
-              <a:t>5/18/20</a:t>
+              <a:t>7/7/20</a:t>
             </a:fld>
             <a:endParaRPr lang="en-US"/>
           </a:p>
@@ -4585,7 +4593,7 @@
           <a:p>
             <a:fld id="{6EB66592-1FC9-4D0B-BF3C-944475169FEE}" type="datetimeFigureOut">
               <a:rPr lang="en-US" smtClean="0"/>
-              <a:t>5/18/20</a:t>
+              <a:t>7/7/20</a:t>
             </a:fld>
             <a:endParaRPr lang="en-US"/>
           </a:p>
@@ -4997,7 +5005,7 @@
           <a:p>
             <a:fld id="{6EB66592-1FC9-4D0B-BF3C-944475169FEE}" type="datetimeFigureOut">
               <a:rPr lang="en-US" smtClean="0"/>
-              <a:t>5/18/20</a:t>
+              <a:t>7/7/20</a:t>
             </a:fld>
             <a:endParaRPr lang="en-US"/>
           </a:p>
@@ -5138,7 +5146,7 @@
           <a:p>
             <a:fld id="{6EB66592-1FC9-4D0B-BF3C-944475169FEE}" type="datetimeFigureOut">
               <a:rPr lang="en-US" smtClean="0"/>
-              <a:t>5/18/20</a:t>
+              <a:t>7/7/20</a:t>
             </a:fld>
             <a:endParaRPr lang="en-US"/>
           </a:p>
@@ -5251,7 +5259,7 @@
           <a:p>
             <a:fld id="{6EB66592-1FC9-4D0B-BF3C-944475169FEE}" type="datetimeFigureOut">
               <a:rPr lang="en-US" smtClean="0"/>
-              <a:t>5/18/20</a:t>
+              <a:t>7/7/20</a:t>
             </a:fld>
             <a:endParaRPr lang="en-US"/>
           </a:p>
@@ -5562,7 +5570,7 @@
           <a:p>
             <a:fld id="{6EB66592-1FC9-4D0B-BF3C-944475169FEE}" type="datetimeFigureOut">
               <a:rPr lang="en-US" smtClean="0"/>
-              <a:t>5/18/20</a:t>
+              <a:t>7/7/20</a:t>
             </a:fld>
             <a:endParaRPr lang="en-US"/>
           </a:p>
@@ -5850,7 +5858,7 @@
           <a:p>
             <a:fld id="{6EB66592-1FC9-4D0B-BF3C-944475169FEE}" type="datetimeFigureOut">
               <a:rPr lang="en-US" smtClean="0"/>
-              <a:t>5/18/20</a:t>
+              <a:t>7/7/20</a:t>
             </a:fld>
             <a:endParaRPr lang="en-US"/>
           </a:p>
@@ -6091,7 +6099,7 @@
           <a:p>
             <a:fld id="{6EB66592-1FC9-4D0B-BF3C-944475169FEE}" type="datetimeFigureOut">
               <a:rPr lang="en-US" smtClean="0"/>
-              <a:t>5/18/20</a:t>
+              <a:t>7/7/20</a:t>
             </a:fld>
             <a:endParaRPr lang="en-US"/>
           </a:p>

</xml_diff>